<commit_message>
Update lfs-course official repository address,etc.
1. Update the lfs-course official repository address from "gitee.com/openeuler-practice-courses/lfs-course" to "gitee.com/openeuler/lfs-course" in all of the documents and shell scripts.
2. Correct some errors in the scripts.
3. Optimize the articulation of scripts to scripts.

Signed-off-by: manjucc <106427133@qq.com>
</commit_message>
<xml_diff>
--- a/lfs-7.7-systemd/documents/LFS-on-openEuler_Lecture-Handout_v1.3.pptx
+++ b/lfs-7.7-systemd/documents/LFS-on-openEuler_Lecture-Handout_v1.3.pptx
@@ -267,7 +267,7 @@
               <a:rPr lang="en-US" smtClean="0">
                 <a:latin typeface="Huawei Sans" panose="020C0503030203020204" pitchFamily="34" charset="0"/>
               </a:rPr>
-              <a:t>1/13/2022</a:t>
+              <a:t>1/20/2022</a:t>
             </a:fld>
             <a:endParaRPr lang="en-US" dirty="0">
               <a:latin typeface="Huawei Sans" panose="020C0503030203020204" pitchFamily="34" charset="0"/>
@@ -28896,8 +28896,20 @@
               <a:t>平台（</a:t>
             </a:r>
             <a:r>
-              <a:rPr lang="en-US" dirty="0"/>
-              <a:t>https://gitee.com/）</a:t>
+              <a:rPr lang="en-US" dirty="0">
+                <a:hlinkClick r:id="rId2"/>
+              </a:rPr>
+              <a:t>https://gitee.</a:t>
+            </a:r>
+            <a:r>
+              <a:rPr lang="en-US">
+                <a:hlinkClick r:id="rId2"/>
+              </a:rPr>
+              <a:t>com/</a:t>
+            </a:r>
+            <a:r>
+              <a:rPr lang="en-US"/>
+              <a:t> ）</a:t>
             </a:r>
             <a:r>
               <a:rPr lang="zh-TW" altLang="en-US" dirty="0"/>
@@ -29533,7 +29545,7 @@
               <a:rPr lang="en-US" altLang="zh-CN" dirty="0">
                 <a:hlinkClick r:id="rId4"/>
               </a:rPr>
-              <a:t>https://gitee.com/openeuler-practice-courses/lfs-course</a:t>
+              <a:t>https://gitee.com/openeuler/lfs-course</a:t>
             </a:r>
             <a:r>
               <a:rPr lang="en-US" altLang="zh-CN" dirty="0"/>
@@ -30749,8 +30761,12 @@
               <a:t>注册 </a:t>
             </a:r>
             <a:r>
+              <a:rPr lang="en-US" altLang="zh-TW" dirty="0" err="1"/>
+              <a:t>G</a:t>
+            </a:r>
+            <a:r>
               <a:rPr lang="en-US" dirty="0" err="1"/>
-              <a:t>gitee</a:t>
+              <a:t>itee</a:t>
             </a:r>
             <a:r>
               <a:rPr lang="en-US" dirty="0"/>
@@ -30768,12 +30784,28 @@
               <a:t>在 </a:t>
             </a:r>
             <a:r>
+              <a:rPr lang="en-US" altLang="zh-TW" dirty="0" err="1"/>
+              <a:t>G</a:t>
+            </a:r>
+            <a:r>
               <a:rPr lang="en-US" dirty="0" err="1"/>
-              <a:t>gitee（https</a:t>
+              <a:t>itee（</a:t>
+            </a:r>
+            <a:r>
+              <a:rPr lang="en-US" dirty="0" err="1">
+                <a:hlinkClick r:id="rId3"/>
+              </a:rPr>
+              <a:t>https</a:t>
+            </a:r>
+            <a:r>
+              <a:rPr lang="en-US" dirty="0">
+                <a:hlinkClick r:id="rId3"/>
+              </a:rPr>
+              <a:t>://gitee.com/</a:t>
             </a:r>
             <a:r>
               <a:rPr lang="en-US" dirty="0"/>
-              <a:t>://gitee.com/）</a:t>
+              <a:t> ）</a:t>
             </a:r>
             <a:r>
               <a:rPr lang="zh-TW" altLang="en-US" dirty="0"/>
@@ -30823,7 +30855,25 @@
             </a:r>
             <a:r>
               <a:rPr lang="zh-TW" altLang="en-US" dirty="0"/>
-              <a:t>创新实践课官方代码仓，下载</a:t>
+              <a:t>创新实践课官方代码仓（</a:t>
+            </a:r>
+            <a:r>
+              <a:rPr lang="en-US" altLang="zh-TW" dirty="0"/>
+              <a:t> </a:t>
+            </a:r>
+            <a:r>
+              <a:rPr lang="en-US" altLang="zh-TW" dirty="0">
+                <a:hlinkClick r:id="rId4"/>
+              </a:rPr>
+              <a:t>https://gitee.com/openeuler/lfs-course</a:t>
+            </a:r>
+            <a:r>
+              <a:rPr lang="en-US" altLang="zh-TW" dirty="0"/>
+              <a:t> </a:t>
+            </a:r>
+            <a:r>
+              <a:rPr lang="zh-TW" altLang="en-US" dirty="0"/>
+              <a:t>），下载</a:t>
             </a:r>
             <a:r>
               <a:rPr lang="zh-CN" altLang="en-US" dirty="0"/>
@@ -30849,76 +30899,6 @@
           </a:p>
         </p:txBody>
       </p:sp>
-      <p:pic>
-        <p:nvPicPr>
-          <p:cNvPr id="4" name="图片 3">
-            <a:extLst>
-              <a:ext uri="{FF2B5EF4-FFF2-40B4-BE49-F238E27FC236}">
-                <a16:creationId xmlns:a16="http://schemas.microsoft.com/office/drawing/2014/main" id="{AA182107-BB07-41E8-89D6-F83740678ABC}"/>
-              </a:ext>
-            </a:extLst>
-          </p:cNvPr>
-          <p:cNvPicPr>
-            <a:picLocks noChangeAspect="1"/>
-          </p:cNvPicPr>
-          <p:nvPr/>
-        </p:nvPicPr>
-        <p:blipFill>
-          <a:blip r:embed="rId3"/>
-          <a:stretch>
-            <a:fillRect/>
-          </a:stretch>
-        </p:blipFill>
-        <p:spPr>
-          <a:xfrm>
-            <a:off x="455613" y="3399332"/>
-            <a:ext cx="5311431" cy="2426586"/>
-          </a:xfrm>
-          <a:prstGeom prst="rect">
-            <a:avLst/>
-          </a:prstGeom>
-          <a:solidFill>
-            <a:schemeClr val="bg1">
-              <a:lumMod val="85000"/>
-            </a:schemeClr>
-          </a:solidFill>
-        </p:spPr>
-      </p:pic>
-      <p:pic>
-        <p:nvPicPr>
-          <p:cNvPr id="5" name="图片 4">
-            <a:extLst>
-              <a:ext uri="{FF2B5EF4-FFF2-40B4-BE49-F238E27FC236}">
-                <a16:creationId xmlns:a16="http://schemas.microsoft.com/office/drawing/2014/main" id="{338BEDC9-8815-4C25-886D-418B8C2581D9}"/>
-              </a:ext>
-            </a:extLst>
-          </p:cNvPr>
-          <p:cNvPicPr>
-            <a:picLocks noChangeAspect="1"/>
-          </p:cNvPicPr>
-          <p:nvPr/>
-        </p:nvPicPr>
-        <p:blipFill>
-          <a:blip r:embed="rId4"/>
-          <a:stretch>
-            <a:fillRect/>
-          </a:stretch>
-        </p:blipFill>
-        <p:spPr>
-          <a:xfrm>
-            <a:off x="5872371" y="3399332"/>
-            <a:ext cx="5874671" cy="2426586"/>
-          </a:xfrm>
-          <a:prstGeom prst="rect">
-            <a:avLst/>
-          </a:prstGeom>
-          <a:solidFill>
-            <a:schemeClr val="bg1">
-              <a:lumMod val="85000"/>
-            </a:schemeClr>
-          </a:solidFill>
-        </p:spPr>
-      </p:pic>
     </p:spTree>
     <p:extLst>
       <p:ext uri="{BB962C8B-B14F-4D97-AF65-F5344CB8AC3E}">

</xml_diff>